<commit_message>
StackExchange-style category listing, dynamic Q&A links, UI tweaks
</commit_message>
<xml_diff>
--- a/public/images/stkup_graphics.pptx
+++ b/public/images/stkup_graphics.pptx
@@ -288,7 +288,8 @@
           <a:p>
             <a:fld id="{4F3592E5-9104-3548-B333-EDEA616CA1D8}" type="datetimeFigureOut">
               <a:rPr lang="en-US" smtClean="0"/>
-              <a:t>9/14/11</a:t>
+              <a:pPr/>
+              <a:t>9/16/11</a:t>
             </a:fld>
             <a:endParaRPr lang="en-US"/>
           </a:p>
@@ -330,6 +331,7 @@
           <a:p>
             <a:fld id="{15B2AA8F-4D4B-D74B-ACE0-FF0244AF9108}" type="slidenum">
               <a:rPr lang="en-US" smtClean="0"/>
+              <a:pPr/>
               <a:t>‹#›</a:t>
             </a:fld>
             <a:endParaRPr lang="en-US"/>
@@ -453,7 +455,8 @@
           <a:p>
             <a:fld id="{4F3592E5-9104-3548-B333-EDEA616CA1D8}" type="datetimeFigureOut">
               <a:rPr lang="en-US" smtClean="0"/>
-              <a:t>9/14/11</a:t>
+              <a:pPr/>
+              <a:t>9/16/11</a:t>
             </a:fld>
             <a:endParaRPr lang="en-US"/>
           </a:p>
@@ -495,6 +498,7 @@
           <a:p>
             <a:fld id="{15B2AA8F-4D4B-D74B-ACE0-FF0244AF9108}" type="slidenum">
               <a:rPr lang="en-US" smtClean="0"/>
+              <a:pPr/>
               <a:t>‹#›</a:t>
             </a:fld>
             <a:endParaRPr lang="en-US"/>
@@ -628,7 +632,8 @@
           <a:p>
             <a:fld id="{4F3592E5-9104-3548-B333-EDEA616CA1D8}" type="datetimeFigureOut">
               <a:rPr lang="en-US" smtClean="0"/>
-              <a:t>9/14/11</a:t>
+              <a:pPr/>
+              <a:t>9/16/11</a:t>
             </a:fld>
             <a:endParaRPr lang="en-US"/>
           </a:p>
@@ -670,6 +675,7 @@
           <a:p>
             <a:fld id="{15B2AA8F-4D4B-D74B-ACE0-FF0244AF9108}" type="slidenum">
               <a:rPr lang="en-US" smtClean="0"/>
+              <a:pPr/>
               <a:t>‹#›</a:t>
             </a:fld>
             <a:endParaRPr lang="en-US"/>
@@ -793,7 +799,8 @@
           <a:p>
             <a:fld id="{4F3592E5-9104-3548-B333-EDEA616CA1D8}" type="datetimeFigureOut">
               <a:rPr lang="en-US" smtClean="0"/>
-              <a:t>9/14/11</a:t>
+              <a:pPr/>
+              <a:t>9/16/11</a:t>
             </a:fld>
             <a:endParaRPr lang="en-US"/>
           </a:p>
@@ -835,6 +842,7 @@
           <a:p>
             <a:fld id="{15B2AA8F-4D4B-D74B-ACE0-FF0244AF9108}" type="slidenum">
               <a:rPr lang="en-US" smtClean="0"/>
+              <a:pPr/>
               <a:t>‹#›</a:t>
             </a:fld>
             <a:endParaRPr lang="en-US"/>
@@ -1034,7 +1042,8 @@
           <a:p>
             <a:fld id="{4F3592E5-9104-3548-B333-EDEA616CA1D8}" type="datetimeFigureOut">
               <a:rPr lang="en-US" smtClean="0"/>
-              <a:t>9/14/11</a:t>
+              <a:pPr/>
+              <a:t>9/16/11</a:t>
             </a:fld>
             <a:endParaRPr lang="en-US"/>
           </a:p>
@@ -1076,6 +1085,7 @@
           <a:p>
             <a:fld id="{15B2AA8F-4D4B-D74B-ACE0-FF0244AF9108}" type="slidenum">
               <a:rPr lang="en-US" smtClean="0"/>
+              <a:pPr/>
               <a:t>‹#›</a:t>
             </a:fld>
             <a:endParaRPr lang="en-US"/>
@@ -1317,7 +1327,8 @@
           <a:p>
             <a:fld id="{4F3592E5-9104-3548-B333-EDEA616CA1D8}" type="datetimeFigureOut">
               <a:rPr lang="en-US" smtClean="0"/>
-              <a:t>9/14/11</a:t>
+              <a:pPr/>
+              <a:t>9/16/11</a:t>
             </a:fld>
             <a:endParaRPr lang="en-US"/>
           </a:p>
@@ -1359,6 +1370,7 @@
           <a:p>
             <a:fld id="{15B2AA8F-4D4B-D74B-ACE0-FF0244AF9108}" type="slidenum">
               <a:rPr lang="en-US" smtClean="0"/>
+              <a:pPr/>
               <a:t>‹#›</a:t>
             </a:fld>
             <a:endParaRPr lang="en-US"/>
@@ -1734,7 +1746,8 @@
           <a:p>
             <a:fld id="{4F3592E5-9104-3548-B333-EDEA616CA1D8}" type="datetimeFigureOut">
               <a:rPr lang="en-US" smtClean="0"/>
-              <a:t>9/14/11</a:t>
+              <a:pPr/>
+              <a:t>9/16/11</a:t>
             </a:fld>
             <a:endParaRPr lang="en-US"/>
           </a:p>
@@ -1776,6 +1789,7 @@
           <a:p>
             <a:fld id="{15B2AA8F-4D4B-D74B-ACE0-FF0244AF9108}" type="slidenum">
               <a:rPr lang="en-US" smtClean="0"/>
+              <a:pPr/>
               <a:t>‹#›</a:t>
             </a:fld>
             <a:endParaRPr lang="en-US"/>
@@ -1847,7 +1861,8 @@
           <a:p>
             <a:fld id="{4F3592E5-9104-3548-B333-EDEA616CA1D8}" type="datetimeFigureOut">
               <a:rPr lang="en-US" smtClean="0"/>
-              <a:t>9/14/11</a:t>
+              <a:pPr/>
+              <a:t>9/16/11</a:t>
             </a:fld>
             <a:endParaRPr lang="en-US"/>
           </a:p>
@@ -1889,6 +1904,7 @@
           <a:p>
             <a:fld id="{15B2AA8F-4D4B-D74B-ACE0-FF0244AF9108}" type="slidenum">
               <a:rPr lang="en-US" smtClean="0"/>
+              <a:pPr/>
               <a:t>‹#›</a:t>
             </a:fld>
             <a:endParaRPr lang="en-US"/>
@@ -1937,7 +1953,8 @@
           <a:p>
             <a:fld id="{4F3592E5-9104-3548-B333-EDEA616CA1D8}" type="datetimeFigureOut">
               <a:rPr lang="en-US" smtClean="0"/>
-              <a:t>9/14/11</a:t>
+              <a:pPr/>
+              <a:t>9/16/11</a:t>
             </a:fld>
             <a:endParaRPr lang="en-US"/>
           </a:p>
@@ -1979,6 +1996,7 @@
           <a:p>
             <a:fld id="{15B2AA8F-4D4B-D74B-ACE0-FF0244AF9108}" type="slidenum">
               <a:rPr lang="en-US" smtClean="0"/>
+              <a:pPr/>
               <a:t>‹#›</a:t>
             </a:fld>
             <a:endParaRPr lang="en-US"/>
@@ -2209,7 +2227,8 @@
           <a:p>
             <a:fld id="{4F3592E5-9104-3548-B333-EDEA616CA1D8}" type="datetimeFigureOut">
               <a:rPr lang="en-US" smtClean="0"/>
-              <a:t>9/14/11</a:t>
+              <a:pPr/>
+              <a:t>9/16/11</a:t>
             </a:fld>
             <a:endParaRPr lang="en-US"/>
           </a:p>
@@ -2251,6 +2270,7 @@
           <a:p>
             <a:fld id="{15B2AA8F-4D4B-D74B-ACE0-FF0244AF9108}" type="slidenum">
               <a:rPr lang="en-US" smtClean="0"/>
+              <a:pPr/>
               <a:t>‹#›</a:t>
             </a:fld>
             <a:endParaRPr lang="en-US"/>
@@ -2457,7 +2477,8 @@
           <a:p>
             <a:fld id="{4F3592E5-9104-3548-B333-EDEA616CA1D8}" type="datetimeFigureOut">
               <a:rPr lang="en-US" smtClean="0"/>
-              <a:t>9/14/11</a:t>
+              <a:pPr/>
+              <a:t>9/16/11</a:t>
             </a:fld>
             <a:endParaRPr lang="en-US"/>
           </a:p>
@@ -2499,6 +2520,7 @@
           <a:p>
             <a:fld id="{15B2AA8F-4D4B-D74B-ACE0-FF0244AF9108}" type="slidenum">
               <a:rPr lang="en-US" smtClean="0"/>
+              <a:pPr/>
               <a:t>‹#›</a:t>
             </a:fld>
             <a:endParaRPr lang="en-US"/>
@@ -2665,7 +2687,8 @@
           <a:p>
             <a:fld id="{4F3592E5-9104-3548-B333-EDEA616CA1D8}" type="datetimeFigureOut">
               <a:rPr lang="en-US" smtClean="0"/>
-              <a:t>9/14/11</a:t>
+              <a:pPr/>
+              <a:t>9/16/11</a:t>
             </a:fld>
             <a:endParaRPr lang="en-US"/>
           </a:p>
@@ -2743,6 +2766,7 @@
           <a:p>
             <a:fld id="{15B2AA8F-4D4B-D74B-ACE0-FF0244AF9108}" type="slidenum">
               <a:rPr lang="en-US" smtClean="0"/>
+              <a:pPr/>
               <a:t>‹#›</a:t>
             </a:fld>
             <a:endParaRPr lang="en-US"/>
@@ -3089,6 +3113,44 @@
           </a:prstGeom>
         </p:spPr>
       </p:pic>
+      <p:pic>
+        <p:nvPicPr>
+          <p:cNvPr id="6" name="Picture 5" descr="stack_icon.png"/>
+          <p:cNvPicPr>
+            <a:picLocks noChangeAspect="1"/>
+          </p:cNvPicPr>
+          <p:nvPr/>
+        </p:nvPicPr>
+        <p:blipFill>
+          <a:blip r:embed="rId3"/>
+          <a:stretch>
+            <a:fillRect/>
+          </a:stretch>
+        </p:blipFill>
+        <p:spPr>
+          <a:xfrm>
+            <a:off x="4229100" y="1822450"/>
+            <a:ext cx="685800" cy="698500"/>
+          </a:xfrm>
+          <a:prstGeom prst="rect">
+            <a:avLst/>
+          </a:prstGeom>
+          <a:ln w="38100" cap="sq">
+            <a:solidFill>
+              <a:srgbClr val="000000"/>
+            </a:solidFill>
+            <a:prstDash val="solid"/>
+            <a:miter lim="800000"/>
+          </a:ln>
+          <a:effectLst>
+            <a:outerShdw blurRad="50800" dist="38100" dir="2700000" algn="tl" rotWithShape="0">
+              <a:srgbClr val="000000">
+                <a:alpha val="43000"/>
+              </a:srgbClr>
+            </a:outerShdw>
+          </a:effectLst>
+        </p:spPr>
+      </p:pic>
     </p:spTree>
   </p:cSld>
   <p:clrMapOvr>

</xml_diff>